<commit_message>
refactored main and parser
</commit_message>
<xml_diff>
--- a/pitch-pp/C2Vec.pptx
+++ b/pitch-pp/C2Vec.pptx
@@ -5,10 +5,10 @@
     <p:sldMasterId id="2147483648" r:id="rId4"/>
   </p:sldMasterIdLst>
   <p:notesMasterIdLst>
-    <p:notesMasterId r:id="rId13"/>
+    <p:notesMasterId r:id="rId18"/>
   </p:notesMasterIdLst>
   <p:handoutMasterIdLst>
-    <p:handoutMasterId r:id="rId14"/>
+    <p:handoutMasterId r:id="rId19"/>
   </p:handoutMasterIdLst>
   <p:sldIdLst>
     <p:sldId id="256" r:id="rId5"/>
@@ -17,8 +17,13 @@
     <p:sldId id="261" r:id="rId8"/>
     <p:sldId id="262" r:id="rId9"/>
     <p:sldId id="263" r:id="rId10"/>
-    <p:sldId id="258" r:id="rId11"/>
-    <p:sldId id="259" r:id="rId12"/>
+    <p:sldId id="264" r:id="rId11"/>
+    <p:sldId id="265" r:id="rId12"/>
+    <p:sldId id="266" r:id="rId13"/>
+    <p:sldId id="267" r:id="rId14"/>
+    <p:sldId id="268" r:id="rId15"/>
+    <p:sldId id="258" r:id="rId16"/>
+    <p:sldId id="259" r:id="rId17"/>
   </p:sldIdLst>
   <p:sldSz cx="12192000" cy="6858000"/>
   <p:notesSz cx="6858000" cy="9144000"/>
@@ -224,7 +229,7 @@
             <a:pPr rtl="0"/>
             <a:fld id="{9B11A7A5-20C6-4E69-AACA-E47DADC9EFAA}" type="datetime1">
               <a:rPr lang="de-DE" smtClean="0"/>
-              <a:t>14.03.2024</a:t>
+              <a:t>16.03.2024</a:t>
             </a:fld>
             <a:endParaRPr lang="de-DE" dirty="0"/>
           </a:p>
@@ -406,7 +411,7 @@
             <a:fld id="{BB817352-7D89-4901-9FDB-508A88E9CEFE}" type="datetime1">
               <a:rPr lang="de-DE" smtClean="0"/>
               <a:pPr/>
-              <a:t>14.03.2024</a:t>
+              <a:t>16.03.2024</a:t>
             </a:fld>
             <a:endParaRPr lang="de-DE" dirty="0"/>
           </a:p>
@@ -9816,6 +9821,915 @@
 </p:sld>
 </file>
 
+<file path=ppt/slides/slide10.xml><?xml version="1.0" encoding="utf-8"?>
+<p:sld xmlns:a="http://schemas.openxmlformats.org/drawingml/2006/main" xmlns:r="http://schemas.openxmlformats.org/officeDocument/2006/relationships" xmlns:p="http://schemas.openxmlformats.org/presentationml/2006/main">
+  <p:cSld>
+    <p:spTree>
+      <p:nvGrpSpPr>
+        <p:cNvPr id="1" name=""/>
+        <p:cNvGrpSpPr/>
+        <p:nvPr/>
+      </p:nvGrpSpPr>
+      <p:grpSpPr>
+        <a:xfrm>
+          <a:off x="0" y="0"/>
+          <a:ext cx="0" cy="0"/>
+          <a:chOff x="0" y="0"/>
+          <a:chExt cx="0" cy="0"/>
+        </a:xfrm>
+      </p:grpSpPr>
+      <p:sp>
+        <p:nvSpPr>
+          <p:cNvPr id="2" name="Title 1">
+            <a:extLst>
+              <a:ext uri="{FF2B5EF4-FFF2-40B4-BE49-F238E27FC236}">
+                <a16:creationId xmlns:a16="http://schemas.microsoft.com/office/drawing/2014/main" id="{BF6F7C28-0594-25F2-94B4-7D6B727E9060}"/>
+              </a:ext>
+            </a:extLst>
+          </p:cNvPr>
+          <p:cNvSpPr>
+            <a:spLocks noGrp="1"/>
+          </p:cNvSpPr>
+          <p:nvPr>
+            <p:ph type="title"/>
+          </p:nvPr>
+        </p:nvSpPr>
+        <p:spPr/>
+        <p:txBody>
+          <a:bodyPr/>
+          <a:lstStyle/>
+          <a:p>
+            <a:r>
+              <a:rPr lang="en-US" dirty="0"/>
+              <a:t>Llama generated Code Summaries</a:t>
+            </a:r>
+            <a:br>
+              <a:rPr lang="en-US" dirty="0"/>
+            </a:br>
+            <a:endParaRPr lang="en-US" dirty="0"/>
+          </a:p>
+        </p:txBody>
+      </p:sp>
+      <p:sp>
+        <p:nvSpPr>
+          <p:cNvPr id="3" name="Date Placeholder 2">
+            <a:extLst>
+              <a:ext uri="{FF2B5EF4-FFF2-40B4-BE49-F238E27FC236}">
+                <a16:creationId xmlns:a16="http://schemas.microsoft.com/office/drawing/2014/main" id="{E04E00AD-6B92-E778-5CF1-3BD2ABF0C1E3}"/>
+              </a:ext>
+            </a:extLst>
+          </p:cNvPr>
+          <p:cNvSpPr>
+            <a:spLocks noGrp="1"/>
+          </p:cNvSpPr>
+          <p:nvPr>
+            <p:ph type="dt" sz="half" idx="10"/>
+          </p:nvPr>
+        </p:nvSpPr>
+        <p:spPr/>
+        <p:txBody>
+          <a:bodyPr/>
+          <a:lstStyle/>
+          <a:p>
+            <a:pPr rtl="0"/>
+            <a:r>
+              <a:rPr lang="de-DE"/>
+              <a:t>20XX</a:t>
+            </a:r>
+          </a:p>
+        </p:txBody>
+      </p:sp>
+      <p:sp>
+        <p:nvSpPr>
+          <p:cNvPr id="4" name="Footer Placeholder 3">
+            <a:extLst>
+              <a:ext uri="{FF2B5EF4-FFF2-40B4-BE49-F238E27FC236}">
+                <a16:creationId xmlns:a16="http://schemas.microsoft.com/office/drawing/2014/main" id="{CAC84D10-C8A6-2AB4-8A75-CD25A210257A}"/>
+              </a:ext>
+            </a:extLst>
+          </p:cNvPr>
+          <p:cNvSpPr>
+            <a:spLocks noGrp="1"/>
+          </p:cNvSpPr>
+          <p:nvPr>
+            <p:ph type="ftr" sz="quarter" idx="11"/>
+          </p:nvPr>
+        </p:nvSpPr>
+        <p:spPr/>
+        <p:txBody>
+          <a:bodyPr/>
+          <a:lstStyle/>
+          <a:p>
+            <a:pPr rtl="0"/>
+            <a:r>
+              <a:rPr lang="de-DE"/>
+              <a:t>PRÄSENTATIONSTITEL</a:t>
+            </a:r>
+          </a:p>
+        </p:txBody>
+      </p:sp>
+      <p:sp>
+        <p:nvSpPr>
+          <p:cNvPr id="5" name="Slide Number Placeholder 4">
+            <a:extLst>
+              <a:ext uri="{FF2B5EF4-FFF2-40B4-BE49-F238E27FC236}">
+                <a16:creationId xmlns:a16="http://schemas.microsoft.com/office/drawing/2014/main" id="{9EA68215-8174-99B4-B185-7390578D2992}"/>
+              </a:ext>
+            </a:extLst>
+          </p:cNvPr>
+          <p:cNvSpPr>
+            <a:spLocks noGrp="1"/>
+          </p:cNvSpPr>
+          <p:nvPr>
+            <p:ph type="sldNum" sz="quarter" idx="12"/>
+          </p:nvPr>
+        </p:nvSpPr>
+        <p:spPr/>
+        <p:txBody>
+          <a:bodyPr/>
+          <a:lstStyle/>
+          <a:p>
+            <a:pPr rtl="0"/>
+            <a:fld id="{A49DFD55-3C28-40EF-9E31-A92D2E4017FF}" type="slidenum">
+              <a:rPr lang="de-DE" smtClean="0"/>
+              <a:pPr rtl="0"/>
+              <a:t>10</a:t>
+            </a:fld>
+            <a:endParaRPr lang="de-DE" dirty="0"/>
+          </a:p>
+        </p:txBody>
+      </p:sp>
+      <p:sp>
+        <p:nvSpPr>
+          <p:cNvPr id="6" name="Chart Placeholder 5">
+            <a:extLst>
+              <a:ext uri="{FF2B5EF4-FFF2-40B4-BE49-F238E27FC236}">
+                <a16:creationId xmlns:a16="http://schemas.microsoft.com/office/drawing/2014/main" id="{BF1865F8-A2E5-3BEB-D9A2-AB71C5C15CB0}"/>
+              </a:ext>
+            </a:extLst>
+          </p:cNvPr>
+          <p:cNvSpPr>
+            <a:spLocks noGrp="1"/>
+          </p:cNvSpPr>
+          <p:nvPr>
+            <p:ph type="chart" sz="quarter" idx="13"/>
+          </p:nvPr>
+        </p:nvSpPr>
+        <p:spPr>
+          <a:xfrm>
+            <a:off x="838200" y="3966358"/>
+            <a:ext cx="10515600" cy="1890162"/>
+          </a:xfrm>
+        </p:spPr>
+        <p:txBody>
+          <a:bodyPr/>
+          <a:lstStyle/>
+          <a:p>
+            <a:endParaRPr lang="en-US"/>
+          </a:p>
+        </p:txBody>
+      </p:sp>
+    </p:spTree>
+    <p:extLst>
+      <p:ext uri="{BB962C8B-B14F-4D97-AF65-F5344CB8AC3E}">
+        <p14:creationId xmlns:p14="http://schemas.microsoft.com/office/powerpoint/2010/main" val="1235244781"/>
+      </p:ext>
+    </p:extLst>
+  </p:cSld>
+  <p:clrMapOvr>
+    <a:masterClrMapping/>
+  </p:clrMapOvr>
+</p:sld>
+</file>
+
+<file path=ppt/slides/slide11.xml><?xml version="1.0" encoding="utf-8"?>
+<p:sld xmlns:a="http://schemas.openxmlformats.org/drawingml/2006/main" xmlns:r="http://schemas.openxmlformats.org/officeDocument/2006/relationships" xmlns:p="http://schemas.openxmlformats.org/presentationml/2006/main">
+  <p:cSld>
+    <p:spTree>
+      <p:nvGrpSpPr>
+        <p:cNvPr id="1" name=""/>
+        <p:cNvGrpSpPr/>
+        <p:nvPr/>
+      </p:nvGrpSpPr>
+      <p:grpSpPr>
+        <a:xfrm>
+          <a:off x="0" y="0"/>
+          <a:ext cx="0" cy="0"/>
+          <a:chOff x="0" y="0"/>
+          <a:chExt cx="0" cy="0"/>
+        </a:xfrm>
+      </p:grpSpPr>
+      <p:sp>
+        <p:nvSpPr>
+          <p:cNvPr id="2" name="Title 1">
+            <a:extLst>
+              <a:ext uri="{FF2B5EF4-FFF2-40B4-BE49-F238E27FC236}">
+                <a16:creationId xmlns:a16="http://schemas.microsoft.com/office/drawing/2014/main" id="{D3880E66-B2E9-85FF-600A-E9568F37B74E}"/>
+              </a:ext>
+            </a:extLst>
+          </p:cNvPr>
+          <p:cNvSpPr>
+            <a:spLocks noGrp="1"/>
+          </p:cNvSpPr>
+          <p:nvPr>
+            <p:ph type="title"/>
+          </p:nvPr>
+        </p:nvSpPr>
+        <p:spPr/>
+        <p:txBody>
+          <a:bodyPr/>
+          <a:lstStyle/>
+          <a:p>
+            <a:r>
+              <a:rPr lang="en-US" dirty="0"/>
+              <a:t>Evaluation</a:t>
+            </a:r>
+          </a:p>
+        </p:txBody>
+      </p:sp>
+      <p:sp>
+        <p:nvSpPr>
+          <p:cNvPr id="3" name="Date Placeholder 2">
+            <a:extLst>
+              <a:ext uri="{FF2B5EF4-FFF2-40B4-BE49-F238E27FC236}">
+                <a16:creationId xmlns:a16="http://schemas.microsoft.com/office/drawing/2014/main" id="{09DA89F3-BB02-8A7B-5B4F-9C3A8483555F}"/>
+              </a:ext>
+            </a:extLst>
+          </p:cNvPr>
+          <p:cNvSpPr>
+            <a:spLocks noGrp="1"/>
+          </p:cNvSpPr>
+          <p:nvPr>
+            <p:ph type="dt" sz="half" idx="10"/>
+          </p:nvPr>
+        </p:nvSpPr>
+        <p:spPr/>
+        <p:txBody>
+          <a:bodyPr/>
+          <a:lstStyle/>
+          <a:p>
+            <a:pPr rtl="0"/>
+            <a:r>
+              <a:rPr lang="de-DE"/>
+              <a:t>20XX</a:t>
+            </a:r>
+          </a:p>
+        </p:txBody>
+      </p:sp>
+      <p:sp>
+        <p:nvSpPr>
+          <p:cNvPr id="4" name="Footer Placeholder 3">
+            <a:extLst>
+              <a:ext uri="{FF2B5EF4-FFF2-40B4-BE49-F238E27FC236}">
+                <a16:creationId xmlns:a16="http://schemas.microsoft.com/office/drawing/2014/main" id="{469D934D-B109-24C3-E2AD-E4174B8A94A5}"/>
+              </a:ext>
+            </a:extLst>
+          </p:cNvPr>
+          <p:cNvSpPr>
+            <a:spLocks noGrp="1"/>
+          </p:cNvSpPr>
+          <p:nvPr>
+            <p:ph type="ftr" sz="quarter" idx="11"/>
+          </p:nvPr>
+        </p:nvSpPr>
+        <p:spPr/>
+        <p:txBody>
+          <a:bodyPr/>
+          <a:lstStyle/>
+          <a:p>
+            <a:pPr rtl="0"/>
+            <a:r>
+              <a:rPr lang="de-DE"/>
+              <a:t>PRÄSENTATIONSTITEL</a:t>
+            </a:r>
+          </a:p>
+        </p:txBody>
+      </p:sp>
+      <p:sp>
+        <p:nvSpPr>
+          <p:cNvPr id="5" name="Slide Number Placeholder 4">
+            <a:extLst>
+              <a:ext uri="{FF2B5EF4-FFF2-40B4-BE49-F238E27FC236}">
+                <a16:creationId xmlns:a16="http://schemas.microsoft.com/office/drawing/2014/main" id="{A80DCEA5-45ED-DE1E-A4AB-65EE72E6FCB1}"/>
+              </a:ext>
+            </a:extLst>
+          </p:cNvPr>
+          <p:cNvSpPr>
+            <a:spLocks noGrp="1"/>
+          </p:cNvSpPr>
+          <p:nvPr>
+            <p:ph type="sldNum" sz="quarter" idx="12"/>
+          </p:nvPr>
+        </p:nvSpPr>
+        <p:spPr/>
+        <p:txBody>
+          <a:bodyPr/>
+          <a:lstStyle/>
+          <a:p>
+            <a:pPr rtl="0"/>
+            <a:fld id="{A49DFD55-3C28-40EF-9E31-A92D2E4017FF}" type="slidenum">
+              <a:rPr lang="de-DE" smtClean="0"/>
+              <a:pPr rtl="0"/>
+              <a:t>11</a:t>
+            </a:fld>
+            <a:endParaRPr lang="de-DE" dirty="0"/>
+          </a:p>
+        </p:txBody>
+      </p:sp>
+      <p:sp>
+        <p:nvSpPr>
+          <p:cNvPr id="6" name="Chart Placeholder 5">
+            <a:extLst>
+              <a:ext uri="{FF2B5EF4-FFF2-40B4-BE49-F238E27FC236}">
+                <a16:creationId xmlns:a16="http://schemas.microsoft.com/office/drawing/2014/main" id="{7CFFA23D-2DC9-839C-9306-90C029ECD792}"/>
+              </a:ext>
+            </a:extLst>
+          </p:cNvPr>
+          <p:cNvSpPr>
+            <a:spLocks noGrp="1"/>
+          </p:cNvSpPr>
+          <p:nvPr>
+            <p:ph type="chart" sz="quarter" idx="13"/>
+          </p:nvPr>
+        </p:nvSpPr>
+        <p:spPr>
+          <a:xfrm>
+            <a:off x="838200" y="3289464"/>
+            <a:ext cx="10515600" cy="2567055"/>
+          </a:xfrm>
+        </p:spPr>
+        <p:txBody>
+          <a:bodyPr/>
+          <a:lstStyle/>
+          <a:p>
+            <a:endParaRPr lang="en-US"/>
+          </a:p>
+        </p:txBody>
+      </p:sp>
+    </p:spTree>
+    <p:extLst>
+      <p:ext uri="{BB962C8B-B14F-4D97-AF65-F5344CB8AC3E}">
+        <p14:creationId xmlns:p14="http://schemas.microsoft.com/office/powerpoint/2010/main" val="1542819243"/>
+      </p:ext>
+    </p:extLst>
+  </p:cSld>
+  <p:clrMapOvr>
+    <a:masterClrMapping/>
+  </p:clrMapOvr>
+</p:sld>
+</file>
+
+<file path=ppt/slides/slide12.xml><?xml version="1.0" encoding="utf-8"?>
+<p:sld xmlns:a="http://schemas.openxmlformats.org/drawingml/2006/main" xmlns:r="http://schemas.openxmlformats.org/officeDocument/2006/relationships" xmlns:p="http://schemas.openxmlformats.org/presentationml/2006/main">
+  <p:cSld>
+    <p:spTree>
+      <p:nvGrpSpPr>
+        <p:cNvPr id="1" name=""/>
+        <p:cNvGrpSpPr/>
+        <p:nvPr/>
+      </p:nvGrpSpPr>
+      <p:grpSpPr>
+        <a:xfrm>
+          <a:off x="0" y="0"/>
+          <a:ext cx="0" cy="0"/>
+          <a:chOff x="0" y="0"/>
+          <a:chExt cx="0" cy="0"/>
+        </a:xfrm>
+      </p:grpSpPr>
+      <p:sp>
+        <p:nvSpPr>
+          <p:cNvPr id="2" name="Titel 1">
+            <a:extLst>
+              <a:ext uri="{FF2B5EF4-FFF2-40B4-BE49-F238E27FC236}">
+                <a16:creationId xmlns:a16="http://schemas.microsoft.com/office/drawing/2014/main" id="{B0B10710-0358-F0DD-5FA4-C8E1B0EC524D}"/>
+              </a:ext>
+            </a:extLst>
+          </p:cNvPr>
+          <p:cNvSpPr>
+            <a:spLocks noGrp="1"/>
+          </p:cNvSpPr>
+          <p:nvPr>
+            <p:ph type="title"/>
+          </p:nvPr>
+        </p:nvSpPr>
+        <p:spPr/>
+        <p:txBody>
+          <a:bodyPr/>
+          <a:lstStyle/>
+          <a:p>
+            <a:r>
+              <a:rPr lang="de-DE" dirty="0"/>
+              <a:t>Intuitive Ansätze für Trainings Daten</a:t>
+            </a:r>
+          </a:p>
+        </p:txBody>
+      </p:sp>
+      <p:sp>
+        <p:nvSpPr>
+          <p:cNvPr id="3" name="Datumsplatzhalter 2">
+            <a:extLst>
+              <a:ext uri="{FF2B5EF4-FFF2-40B4-BE49-F238E27FC236}">
+                <a16:creationId xmlns:a16="http://schemas.microsoft.com/office/drawing/2014/main" id="{DA8C9263-AC09-0BF3-666E-0E9859B0C100}"/>
+              </a:ext>
+            </a:extLst>
+          </p:cNvPr>
+          <p:cNvSpPr>
+            <a:spLocks noGrp="1"/>
+          </p:cNvSpPr>
+          <p:nvPr>
+            <p:ph type="dt" sz="half" idx="10"/>
+          </p:nvPr>
+        </p:nvSpPr>
+        <p:spPr/>
+        <p:txBody>
+          <a:bodyPr/>
+          <a:lstStyle/>
+          <a:p>
+            <a:pPr rtl="0"/>
+            <a:r>
+              <a:rPr lang="de-DE" dirty="0"/>
+              <a:t>2023</a:t>
+            </a:r>
+          </a:p>
+        </p:txBody>
+      </p:sp>
+      <p:sp>
+        <p:nvSpPr>
+          <p:cNvPr id="4" name="Fußzeilenplatzhalter 3">
+            <a:extLst>
+              <a:ext uri="{FF2B5EF4-FFF2-40B4-BE49-F238E27FC236}">
+                <a16:creationId xmlns:a16="http://schemas.microsoft.com/office/drawing/2014/main" id="{D534F214-0B25-8AD7-5270-433211451A0E}"/>
+              </a:ext>
+            </a:extLst>
+          </p:cNvPr>
+          <p:cNvSpPr>
+            <a:spLocks noGrp="1"/>
+          </p:cNvSpPr>
+          <p:nvPr>
+            <p:ph type="ftr" sz="quarter" idx="11"/>
+          </p:nvPr>
+        </p:nvSpPr>
+        <p:spPr/>
+        <p:txBody>
+          <a:bodyPr/>
+          <a:lstStyle/>
+          <a:p>
+            <a:pPr rtl="0"/>
+            <a:r>
+              <a:rPr lang="de-DE" dirty="0"/>
+              <a:t>Pitch Vortrag</a:t>
+            </a:r>
+          </a:p>
+        </p:txBody>
+      </p:sp>
+      <p:sp>
+        <p:nvSpPr>
+          <p:cNvPr id="5" name="Foliennummernplatzhalter 4">
+            <a:extLst>
+              <a:ext uri="{FF2B5EF4-FFF2-40B4-BE49-F238E27FC236}">
+                <a16:creationId xmlns:a16="http://schemas.microsoft.com/office/drawing/2014/main" id="{52FECC29-6DA9-6596-9D99-E5D356C4C57D}"/>
+              </a:ext>
+            </a:extLst>
+          </p:cNvPr>
+          <p:cNvSpPr>
+            <a:spLocks noGrp="1"/>
+          </p:cNvSpPr>
+          <p:nvPr>
+            <p:ph type="sldNum" sz="quarter" idx="12"/>
+          </p:nvPr>
+        </p:nvSpPr>
+        <p:spPr/>
+        <p:txBody>
+          <a:bodyPr/>
+          <a:lstStyle/>
+          <a:p>
+            <a:pPr rtl="0"/>
+            <a:fld id="{A49DFD55-3C28-40EF-9E31-A92D2E4017FF}" type="slidenum">
+              <a:rPr lang="de-DE" smtClean="0"/>
+              <a:pPr rtl="0"/>
+              <a:t>12</a:t>
+            </a:fld>
+            <a:endParaRPr lang="de-DE" dirty="0"/>
+          </a:p>
+        </p:txBody>
+      </p:sp>
+      <p:sp>
+        <p:nvSpPr>
+          <p:cNvPr id="6" name="Diagrammplatzhalter 5">
+            <a:extLst>
+              <a:ext uri="{FF2B5EF4-FFF2-40B4-BE49-F238E27FC236}">
+                <a16:creationId xmlns:a16="http://schemas.microsoft.com/office/drawing/2014/main" id="{2738D12E-0376-AF91-901A-71B08E9FE842}"/>
+              </a:ext>
+            </a:extLst>
+          </p:cNvPr>
+          <p:cNvSpPr>
+            <a:spLocks noGrp="1"/>
+          </p:cNvSpPr>
+          <p:nvPr>
+            <p:ph type="chart" sz="quarter" idx="13"/>
+          </p:nvPr>
+        </p:nvSpPr>
+        <p:spPr>
+          <a:xfrm>
+            <a:off x="838200" y="2102277"/>
+            <a:ext cx="10515600" cy="1518000"/>
+          </a:xfrm>
+        </p:spPr>
+        <p:txBody>
+          <a:bodyPr/>
+          <a:lstStyle/>
+          <a:p>
+            <a:r>
+              <a:rPr lang="de-DE" dirty="0"/>
+              <a:t>Byte Darstellung des Assemblercodes</a:t>
+            </a:r>
+          </a:p>
+          <a:p>
+            <a:r>
+              <a:rPr lang="de-DE" dirty="0"/>
+              <a:t>Kontrollflussgraphen des Assemblercodes (Node == Basic Block) </a:t>
+            </a:r>
+          </a:p>
+          <a:p>
+            <a:r>
+              <a:rPr lang="de-DE" dirty="0"/>
+              <a:t>Darstellung als Reihen von Instruktionen des Assemblercodes</a:t>
+            </a:r>
+          </a:p>
+        </p:txBody>
+      </p:sp>
+      <mc:AlternateContent xmlns:mc="http://schemas.openxmlformats.org/markup-compatibility/2006" xmlns:a14="http://schemas.microsoft.com/office/drawing/2010/main">
+        <mc:Choice Requires="a14">
+          <p:sp>
+            <p:nvSpPr>
+              <p:cNvPr id="8" name="Textfeld 7">
+                <a:extLst>
+                  <a:ext uri="{FF2B5EF4-FFF2-40B4-BE49-F238E27FC236}">
+                    <a16:creationId xmlns:a16="http://schemas.microsoft.com/office/drawing/2014/main" id="{D4EA6077-5FB7-968D-8F52-F97D958A6BBB}"/>
+                  </a:ext>
+                </a:extLst>
+              </p:cNvPr>
+              <p:cNvSpPr txBox="1"/>
+              <p:nvPr/>
+            </p:nvSpPr>
+            <p:spPr>
+              <a:xfrm>
+                <a:off x="985545" y="4215094"/>
+                <a:ext cx="10808521" cy="1107996"/>
+              </a:xfrm>
+              <a:prstGeom prst="rect">
+                <a:avLst/>
+              </a:prstGeom>
+              <a:noFill/>
+            </p:spPr>
+            <p:txBody>
+              <a:bodyPr wrap="square">
+                <a:spAutoFit/>
+              </a:bodyPr>
+              <a:lstStyle/>
+              <a:p>
+                <a14:m>
+                  <m:oMath xmlns:m="http://schemas.openxmlformats.org/officeDocument/2006/math">
+                    <m:r>
+                      <a:rPr lang="de-DE" sz="2400" i="1" smtClean="0">
+                        <a:latin typeface="Cambria Math" panose="02040503050406030204" pitchFamily="18" charset="0"/>
+                        <a:ea typeface="Cambria Math" panose="02040503050406030204" pitchFamily="18" charset="0"/>
+                      </a:rPr>
+                      <m:t>→</m:t>
+                    </m:r>
+                  </m:oMath>
+                </a14:m>
+                <a:r>
+                  <a:rPr lang="de-DE" sz="2400" dirty="0"/>
+                  <a:t> Semantik des Codes nur kaum oder gar nicht in den Trainingsdaten</a:t>
+                </a:r>
+              </a:p>
+              <a:p>
+                <a:pPr>
+                  <a:spcAft>
+                    <a:spcPts val="0"/>
+                  </a:spcAft>
+                </a:pPr>
+                <a14:m>
+                  <m:oMath xmlns:m="http://schemas.openxmlformats.org/officeDocument/2006/math">
+                    <m:r>
+                      <a:rPr lang="de-DE" sz="2400" i="1" smtClean="0">
+                        <a:latin typeface="Cambria Math" panose="02040503050406030204" pitchFamily="18" charset="0"/>
+                        <a:ea typeface="Cambria Math" panose="02040503050406030204" pitchFamily="18" charset="0"/>
+                      </a:rPr>
+                      <m:t>→</m:t>
+                    </m:r>
+                    <m:r>
+                      <a:rPr lang="de-DE" sz="2400" b="0" i="1" smtClean="0">
+                        <a:latin typeface="Cambria Math" panose="02040503050406030204" pitchFamily="18" charset="0"/>
+                        <a:ea typeface="Cambria Math" panose="02040503050406030204" pitchFamily="18" charset="0"/>
+                      </a:rPr>
+                      <m:t> </m:t>
+                    </m:r>
+                  </m:oMath>
+                </a14:m>
+                <a:r>
+                  <a:rPr lang="de-DE" sz="2400" dirty="0"/>
+                  <a:t>Beim </a:t>
+                </a:r>
+                <a:r>
+                  <a:rPr lang="de-DE" sz="2400" dirty="0">
+                    <a:effectLst/>
+                  </a:rPr>
+                  <a:t>kompilieren zum Assemblercode gehen sehr viele Informationen Verloren</a:t>
+                </a:r>
+              </a:p>
+              <a:p>
+                <a:pPr>
+                  <a:spcAft>
+                    <a:spcPts val="0"/>
+                  </a:spcAft>
+                </a:pPr>
+                <a:endParaRPr lang="de-DE" dirty="0"/>
+              </a:p>
+            </p:txBody>
+          </p:sp>
+        </mc:Choice>
+        <mc:Fallback xmlns="">
+          <p:sp>
+            <p:nvSpPr>
+              <p:cNvPr id="8" name="Textfeld 7">
+                <a:extLst>
+                  <a:ext uri="{FF2B5EF4-FFF2-40B4-BE49-F238E27FC236}">
+                    <a16:creationId xmlns:a16="http://schemas.microsoft.com/office/drawing/2014/main" id="{D4EA6077-5FB7-968D-8F52-F97D958A6BBB}"/>
+                  </a:ext>
+                </a:extLst>
+              </p:cNvPr>
+              <p:cNvSpPr txBox="1">
+                <a:spLocks noRot="1" noChangeAspect="1" noMove="1" noResize="1" noEditPoints="1" noAdjustHandles="1" noChangeArrowheads="1" noChangeShapeType="1" noTextEdit="1"/>
+              </p:cNvSpPr>
+              <p:nvPr/>
+            </p:nvSpPr>
+            <p:spPr>
+              <a:xfrm>
+                <a:off x="985545" y="4215094"/>
+                <a:ext cx="10808521" cy="1107996"/>
+              </a:xfrm>
+              <a:prstGeom prst="rect">
+                <a:avLst/>
+              </a:prstGeom>
+              <a:blipFill>
+                <a:blip r:embed="rId2"/>
+                <a:stretch>
+                  <a:fillRect t="-4396" r="-338"/>
+                </a:stretch>
+              </a:blipFill>
+            </p:spPr>
+            <p:txBody>
+              <a:bodyPr/>
+              <a:lstStyle/>
+              <a:p>
+                <a:r>
+                  <a:rPr lang="de-DE">
+                    <a:noFill/>
+                  </a:rPr>
+                  <a:t> </a:t>
+                </a:r>
+              </a:p>
+            </p:txBody>
+          </p:sp>
+        </mc:Fallback>
+      </mc:AlternateContent>
+    </p:spTree>
+    <p:extLst>
+      <p:ext uri="{BB962C8B-B14F-4D97-AF65-F5344CB8AC3E}">
+        <p14:creationId xmlns:p14="http://schemas.microsoft.com/office/powerpoint/2010/main" val="652343218"/>
+      </p:ext>
+    </p:extLst>
+  </p:cSld>
+  <p:clrMapOvr>
+    <a:masterClrMapping/>
+  </p:clrMapOvr>
+</p:sld>
+</file>
+
+<file path=ppt/slides/slide13.xml><?xml version="1.0" encoding="utf-8"?>
+<p:sld xmlns:a="http://schemas.openxmlformats.org/drawingml/2006/main" xmlns:r="http://schemas.openxmlformats.org/officeDocument/2006/relationships" xmlns:p="http://schemas.openxmlformats.org/presentationml/2006/main">
+  <p:cSld>
+    <p:spTree>
+      <p:nvGrpSpPr>
+        <p:cNvPr id="1" name=""/>
+        <p:cNvGrpSpPr/>
+        <p:nvPr/>
+      </p:nvGrpSpPr>
+      <p:grpSpPr>
+        <a:xfrm>
+          <a:off x="0" y="0"/>
+          <a:ext cx="0" cy="0"/>
+          <a:chOff x="0" y="0"/>
+          <a:chExt cx="0" cy="0"/>
+        </a:xfrm>
+      </p:grpSpPr>
+      <p:sp>
+        <p:nvSpPr>
+          <p:cNvPr id="2" name="Titel 1">
+            <a:extLst>
+              <a:ext uri="{FF2B5EF4-FFF2-40B4-BE49-F238E27FC236}">
+                <a16:creationId xmlns:a16="http://schemas.microsoft.com/office/drawing/2014/main" id="{4E0CE257-127B-9FA3-765A-C5D90A17C486}"/>
+              </a:ext>
+            </a:extLst>
+          </p:cNvPr>
+          <p:cNvSpPr>
+            <a:spLocks noGrp="1"/>
+          </p:cNvSpPr>
+          <p:nvPr>
+            <p:ph type="title"/>
+          </p:nvPr>
+        </p:nvSpPr>
+        <p:spPr>
+          <a:xfrm>
+            <a:off x="838200" y="365125"/>
+            <a:ext cx="10515600" cy="1325563"/>
+          </a:xfrm>
+        </p:spPr>
+        <p:txBody>
+          <a:bodyPr anchor="ctr">
+            <a:normAutofit/>
+          </a:bodyPr>
+          <a:lstStyle/>
+          <a:p>
+            <a:r>
+              <a:rPr lang="de-DE"/>
+              <a:t>Trainings Daten mit Source Code Information</a:t>
+            </a:r>
+            <a:endParaRPr lang="de-DE" dirty="0"/>
+          </a:p>
+        </p:txBody>
+      </p:sp>
+      <p:sp>
+        <p:nvSpPr>
+          <p:cNvPr id="3" name="Datumsplatzhalter 2">
+            <a:extLst>
+              <a:ext uri="{FF2B5EF4-FFF2-40B4-BE49-F238E27FC236}">
+                <a16:creationId xmlns:a16="http://schemas.microsoft.com/office/drawing/2014/main" id="{0C599950-CB4E-B832-C0EF-C33D0AECB9F9}"/>
+              </a:ext>
+            </a:extLst>
+          </p:cNvPr>
+          <p:cNvSpPr>
+            <a:spLocks noGrp="1"/>
+          </p:cNvSpPr>
+          <p:nvPr>
+            <p:ph type="dt" sz="half" idx="10"/>
+          </p:nvPr>
+        </p:nvSpPr>
+        <p:spPr>
+          <a:xfrm>
+            <a:off x="838200" y="6356350"/>
+            <a:ext cx="2743200" cy="365125"/>
+          </a:xfrm>
+        </p:spPr>
+        <p:txBody>
+          <a:bodyPr anchor="ctr">
+            <a:normAutofit/>
+          </a:bodyPr>
+          <a:lstStyle/>
+          <a:p>
+            <a:pPr rtl="0">
+              <a:spcAft>
+                <a:spcPts val="600"/>
+              </a:spcAft>
+            </a:pPr>
+            <a:r>
+              <a:rPr lang="de-DE"/>
+              <a:t>20XX</a:t>
+            </a:r>
+          </a:p>
+        </p:txBody>
+      </p:sp>
+      <p:sp>
+        <p:nvSpPr>
+          <p:cNvPr id="4" name="Fußzeilenplatzhalter 3">
+            <a:extLst>
+              <a:ext uri="{FF2B5EF4-FFF2-40B4-BE49-F238E27FC236}">
+                <a16:creationId xmlns:a16="http://schemas.microsoft.com/office/drawing/2014/main" id="{88E09410-A383-CE2D-739F-52C424469757}"/>
+              </a:ext>
+            </a:extLst>
+          </p:cNvPr>
+          <p:cNvSpPr>
+            <a:spLocks noGrp="1"/>
+          </p:cNvSpPr>
+          <p:nvPr>
+            <p:ph type="ftr" sz="quarter" idx="11"/>
+          </p:nvPr>
+        </p:nvSpPr>
+        <p:spPr>
+          <a:xfrm>
+            <a:off x="4038600" y="6356350"/>
+            <a:ext cx="4114800" cy="365125"/>
+          </a:xfrm>
+        </p:spPr>
+        <p:txBody>
+          <a:bodyPr anchor="ctr">
+            <a:normAutofit/>
+          </a:bodyPr>
+          <a:lstStyle/>
+          <a:p>
+            <a:pPr rtl="0">
+              <a:spcAft>
+                <a:spcPts val="600"/>
+              </a:spcAft>
+            </a:pPr>
+            <a:r>
+              <a:rPr lang="de-DE"/>
+              <a:t>PRÄSENTATIONSTITEL</a:t>
+            </a:r>
+          </a:p>
+        </p:txBody>
+      </p:sp>
+      <p:sp>
+        <p:nvSpPr>
+          <p:cNvPr id="5" name="Foliennummernplatzhalter 4">
+            <a:extLst>
+              <a:ext uri="{FF2B5EF4-FFF2-40B4-BE49-F238E27FC236}">
+                <a16:creationId xmlns:a16="http://schemas.microsoft.com/office/drawing/2014/main" id="{FFECCBB5-DDE9-49DA-E556-0828DE931224}"/>
+              </a:ext>
+            </a:extLst>
+          </p:cNvPr>
+          <p:cNvSpPr>
+            <a:spLocks noGrp="1"/>
+          </p:cNvSpPr>
+          <p:nvPr>
+            <p:ph type="sldNum" sz="quarter" idx="12"/>
+          </p:nvPr>
+        </p:nvSpPr>
+        <p:spPr>
+          <a:xfrm>
+            <a:off x="8610600" y="6356350"/>
+            <a:ext cx="2743200" cy="365125"/>
+          </a:xfrm>
+        </p:spPr>
+        <p:txBody>
+          <a:bodyPr anchor="ctr">
+            <a:normAutofit/>
+          </a:bodyPr>
+          <a:lstStyle/>
+          <a:p>
+            <a:pPr rtl="0">
+              <a:spcAft>
+                <a:spcPts val="600"/>
+              </a:spcAft>
+            </a:pPr>
+            <a:fld id="{A49DFD55-3C28-40EF-9E31-A92D2E4017FF}" type="slidenum">
+              <a:rPr lang="de-DE" smtClean="0"/>
+              <a:pPr rtl="0">
+                <a:spcAft>
+                  <a:spcPts val="600"/>
+                </a:spcAft>
+              </a:pPr>
+              <a:t>13</a:t>
+            </a:fld>
+            <a:endParaRPr lang="de-DE"/>
+          </a:p>
+        </p:txBody>
+      </p:sp>
+      <p:sp>
+        <p:nvSpPr>
+          <p:cNvPr id="24" name="Chart Placeholder 5">
+            <a:extLst>
+              <a:ext uri="{FF2B5EF4-FFF2-40B4-BE49-F238E27FC236}">
+                <a16:creationId xmlns:a16="http://schemas.microsoft.com/office/drawing/2014/main" id="{53C3A909-782F-4152-578C-CADB2F222376}"/>
+              </a:ext>
+            </a:extLst>
+          </p:cNvPr>
+          <p:cNvSpPr>
+            <a:spLocks noGrp="1"/>
+          </p:cNvSpPr>
+          <p:nvPr>
+            <p:ph type="chart" sz="quarter" idx="13"/>
+          </p:nvPr>
+        </p:nvSpPr>
+        <p:spPr>
+          <a:xfrm>
+            <a:off x="838200" y="2111608"/>
+            <a:ext cx="10515600" cy="3744912"/>
+          </a:xfrm>
+        </p:spPr>
+        <p:txBody>
+          <a:bodyPr/>
+          <a:lstStyle/>
+          <a:p>
+            <a:endParaRPr lang="de-DE"/>
+          </a:p>
+        </p:txBody>
+      </p:sp>
+    </p:spTree>
+    <p:extLst>
+      <p:ext uri="{BB962C8B-B14F-4D97-AF65-F5344CB8AC3E}">
+        <p14:creationId xmlns:p14="http://schemas.microsoft.com/office/powerpoint/2010/main" val="1136190312"/>
+      </p:ext>
+    </p:extLst>
+  </p:cSld>
+  <p:clrMapOvr>
+    <a:masterClrMapping/>
+  </p:clrMapOvr>
+</p:sld>
+</file>
+
 <file path=ppt/slides/slide2.xml><?xml version="1.0" encoding="utf-8"?>
 <p:sld xmlns:a="http://schemas.openxmlformats.org/drawingml/2006/main" xmlns:r="http://schemas.openxmlformats.org/officeDocument/2006/relationships" xmlns:p="http://schemas.openxmlformats.org/presentationml/2006/main">
   <p:cSld>
@@ -10063,8 +10977,8 @@
           </a:p>
         </p:txBody>
       </p:sp>
-      <mc:AlternateContent xmlns:mc="http://schemas.openxmlformats.org/markup-compatibility/2006">
-        <mc:Choice xmlns:a14="http://schemas.microsoft.com/office/drawing/2010/main" Requires="a14">
+      <mc:AlternateContent xmlns:mc="http://schemas.openxmlformats.org/markup-compatibility/2006" xmlns:a14="http://schemas.microsoft.com/office/drawing/2010/main">
+        <mc:Choice Requires="a14">
           <p:sp>
             <p:nvSpPr>
               <p:cNvPr id="18" name="Textfeld 17">
@@ -10100,14 +11014,7 @@
                         <a:latin typeface="Cambria Math" panose="02040503050406030204" pitchFamily="18" charset="0"/>
                         <a:ea typeface="Cambria Math" panose="02040503050406030204" pitchFamily="18" charset="0"/>
                       </a:rPr>
-                      <m:t>⇝</m:t>
-                    </m:r>
-                    <m:r>
-                      <a:rPr lang="de-DE" sz="2800" b="0" i="1" smtClean="0">
-                        <a:latin typeface="Cambria Math" panose="02040503050406030204" pitchFamily="18" charset="0"/>
-                        <a:ea typeface="Cambria Math" panose="02040503050406030204" pitchFamily="18" charset="0"/>
-                      </a:rPr>
-                      <m:t> </m:t>
+                      <m:t>⇝ </m:t>
                     </m:r>
                   </m:oMath>
                 </a14:m>
@@ -10126,7 +11033,7 @@
             </p:txBody>
           </p:sp>
         </mc:Choice>
-        <mc:Fallback>
+        <mc:Fallback xmlns="">
           <p:sp>
             <p:nvSpPr>
               <p:cNvPr id="18" name="Textfeld 17">
@@ -10475,8 +11382,8 @@
           </a:p>
         </p:txBody>
       </p:sp>
-      <mc:AlternateContent xmlns:mc="http://schemas.openxmlformats.org/markup-compatibility/2006">
-        <mc:Choice xmlns:a14="http://schemas.microsoft.com/office/drawing/2010/main" Requires="a14">
+      <mc:AlternateContent xmlns:mc="http://schemas.openxmlformats.org/markup-compatibility/2006" xmlns:a14="http://schemas.microsoft.com/office/drawing/2010/main">
+        <mc:Choice Requires="a14">
           <p:sp>
             <p:nvSpPr>
               <p:cNvPr id="6" name="Diagrammplatzhalter 5">
@@ -10664,7 +11571,7 @@
             </p:txBody>
           </p:sp>
         </mc:Choice>
-        <mc:Fallback>
+        <mc:Fallback xmlns="">
           <p:sp>
             <p:nvSpPr>
               <p:cNvPr id="6" name="Diagrammplatzhalter 5">
@@ -10855,8 +11762,8 @@
           </a:p>
         </p:txBody>
       </p:sp>
-      <mc:AlternateContent xmlns:mc="http://schemas.openxmlformats.org/markup-compatibility/2006">
-        <mc:Choice xmlns:a14="http://schemas.microsoft.com/office/drawing/2010/main" Requires="a14">
+      <mc:AlternateContent xmlns:mc="http://schemas.openxmlformats.org/markup-compatibility/2006" xmlns:a14="http://schemas.microsoft.com/office/drawing/2010/main">
+        <mc:Choice Requires="a14">
           <p:sp>
             <p:nvSpPr>
               <p:cNvPr id="6" name="Chart Placeholder 5">
@@ -11065,7 +11972,7 @@
             </p:txBody>
           </p:sp>
         </mc:Choice>
-        <mc:Fallback>
+        <mc:Fallback xmlns="">
           <p:sp>
             <p:nvSpPr>
               <p:cNvPr id="6" name="Chart Placeholder 5">
@@ -11139,8 +12046,8 @@
           </a:prstGeom>
         </p:spPr>
       </p:pic>
-      <mc:AlternateContent xmlns:mc="http://schemas.openxmlformats.org/markup-compatibility/2006">
-        <mc:Choice xmlns:a14="http://schemas.microsoft.com/office/drawing/2010/main" Requires="a14">
+      <mc:AlternateContent xmlns:mc="http://schemas.openxmlformats.org/markup-compatibility/2006" xmlns:a14="http://schemas.microsoft.com/office/drawing/2010/main">
+        <mc:Choice Requires="a14">
           <p:sp>
             <p:nvSpPr>
               <p:cNvPr id="18" name="TextBox 17">
@@ -11191,7 +12098,7 @@
             </p:txBody>
           </p:sp>
         </mc:Choice>
-        <mc:Fallback>
+        <mc:Fallback xmlns="">
           <p:sp>
             <p:nvSpPr>
               <p:cNvPr id="18" name="TextBox 17">
@@ -11392,8 +12299,8 @@
           </a:p>
         </p:txBody>
       </p:sp>
-      <mc:AlternateContent xmlns:mc="http://schemas.openxmlformats.org/markup-compatibility/2006">
-        <mc:Choice xmlns:a14="http://schemas.microsoft.com/office/drawing/2010/main" Requires="a14">
+      <mc:AlternateContent xmlns:mc="http://schemas.openxmlformats.org/markup-compatibility/2006" xmlns:a14="http://schemas.microsoft.com/office/drawing/2010/main">
+        <mc:Choice Requires="a14">
           <p:sp>
             <p:nvSpPr>
               <p:cNvPr id="6" name="Chart Placeholder 5">
@@ -11464,7 +12371,7 @@
             </p:txBody>
           </p:sp>
         </mc:Choice>
-        <mc:Fallback>
+        <mc:Fallback xmlns="">
           <p:sp>
             <p:nvSpPr>
               <p:cNvPr id="6" name="Chart Placeholder 5">
@@ -11816,10 +12723,10 @@
       </p:grpSpPr>
       <p:sp>
         <p:nvSpPr>
-          <p:cNvPr id="2" name="Titel 1">
-            <a:extLst>
-              <a:ext uri="{FF2B5EF4-FFF2-40B4-BE49-F238E27FC236}">
-                <a16:creationId xmlns:a16="http://schemas.microsoft.com/office/drawing/2014/main" id="{B0B10710-0358-F0DD-5FA4-C8E1B0EC524D}"/>
+          <p:cNvPr id="2" name="Title 1">
+            <a:extLst>
+              <a:ext uri="{FF2B5EF4-FFF2-40B4-BE49-F238E27FC236}">
+                <a16:creationId xmlns:a16="http://schemas.microsoft.com/office/drawing/2014/main" id="{52160D54-E2BF-394D-3EAD-2875D361518D}"/>
               </a:ext>
             </a:extLst>
           </p:cNvPr>
@@ -11836,18 +12743,18 @@
           <a:lstStyle/>
           <a:p>
             <a:r>
-              <a:rPr lang="de-DE" dirty="0"/>
-              <a:t>Intuitive Ansätze für Trainings Daten</a:t>
-            </a:r>
-          </a:p>
-        </p:txBody>
-      </p:sp>
-      <p:sp>
-        <p:nvSpPr>
-          <p:cNvPr id="3" name="Datumsplatzhalter 2">
-            <a:extLst>
-              <a:ext uri="{FF2B5EF4-FFF2-40B4-BE49-F238E27FC236}">
-                <a16:creationId xmlns:a16="http://schemas.microsoft.com/office/drawing/2014/main" id="{DA8C9263-AC09-0BF3-666E-0E9859B0C100}"/>
+              <a:rPr lang="en-US" dirty="0"/>
+              <a:t>My part</a:t>
+            </a:r>
+          </a:p>
+        </p:txBody>
+      </p:sp>
+      <p:sp>
+        <p:nvSpPr>
+          <p:cNvPr id="3" name="Date Placeholder 2">
+            <a:extLst>
+              <a:ext uri="{FF2B5EF4-FFF2-40B4-BE49-F238E27FC236}">
+                <a16:creationId xmlns:a16="http://schemas.microsoft.com/office/drawing/2014/main" id="{D97CB15C-26F3-7A1A-556F-ABE7F24E4FD2}"/>
               </a:ext>
             </a:extLst>
           </p:cNvPr>
@@ -11865,18 +12772,18 @@
           <a:p>
             <a:pPr rtl="0"/>
             <a:r>
-              <a:rPr lang="de-DE" dirty="0"/>
-              <a:t>2023</a:t>
-            </a:r>
-          </a:p>
-        </p:txBody>
-      </p:sp>
-      <p:sp>
-        <p:nvSpPr>
-          <p:cNvPr id="4" name="Fußzeilenplatzhalter 3">
-            <a:extLst>
-              <a:ext uri="{FF2B5EF4-FFF2-40B4-BE49-F238E27FC236}">
-                <a16:creationId xmlns:a16="http://schemas.microsoft.com/office/drawing/2014/main" id="{D534F214-0B25-8AD7-5270-433211451A0E}"/>
+              <a:rPr lang="de-DE"/>
+              <a:t>20XX</a:t>
+            </a:r>
+          </a:p>
+        </p:txBody>
+      </p:sp>
+      <p:sp>
+        <p:nvSpPr>
+          <p:cNvPr id="4" name="Footer Placeholder 3">
+            <a:extLst>
+              <a:ext uri="{FF2B5EF4-FFF2-40B4-BE49-F238E27FC236}">
+                <a16:creationId xmlns:a16="http://schemas.microsoft.com/office/drawing/2014/main" id="{1DA4CCF6-9676-1F8E-3DEE-F6FC7122CA8B}"/>
               </a:ext>
             </a:extLst>
           </p:cNvPr>
@@ -11894,18 +12801,18 @@
           <a:p>
             <a:pPr rtl="0"/>
             <a:r>
-              <a:rPr lang="de-DE" dirty="0"/>
-              <a:t>Pitch Vortrag</a:t>
-            </a:r>
-          </a:p>
-        </p:txBody>
-      </p:sp>
-      <p:sp>
-        <p:nvSpPr>
-          <p:cNvPr id="5" name="Foliennummernplatzhalter 4">
-            <a:extLst>
-              <a:ext uri="{FF2B5EF4-FFF2-40B4-BE49-F238E27FC236}">
-                <a16:creationId xmlns:a16="http://schemas.microsoft.com/office/drawing/2014/main" id="{52FECC29-6DA9-6596-9D99-E5D356C4C57D}"/>
+              <a:rPr lang="de-DE"/>
+              <a:t>PRÄSENTATIONSTITEL</a:t>
+            </a:r>
+          </a:p>
+        </p:txBody>
+      </p:sp>
+      <p:sp>
+        <p:nvSpPr>
+          <p:cNvPr id="5" name="Slide Number Placeholder 4">
+            <a:extLst>
+              <a:ext uri="{FF2B5EF4-FFF2-40B4-BE49-F238E27FC236}">
+                <a16:creationId xmlns:a16="http://schemas.microsoft.com/office/drawing/2014/main" id="{1DFA5756-2B08-015D-D715-B2A31FFBFA65}"/>
               </a:ext>
             </a:extLst>
           </p:cNvPr>
@@ -11933,10 +12840,10 @@
       </p:sp>
       <p:sp>
         <p:nvSpPr>
-          <p:cNvPr id="6" name="Diagrammplatzhalter 5">
-            <a:extLst>
-              <a:ext uri="{FF2B5EF4-FFF2-40B4-BE49-F238E27FC236}">
-                <a16:creationId xmlns:a16="http://schemas.microsoft.com/office/drawing/2014/main" id="{2738D12E-0376-AF91-901A-71B08E9FE842}"/>
+          <p:cNvPr id="6" name="Chart Placeholder 5">
+            <a:extLst>
+              <a:ext uri="{FF2B5EF4-FFF2-40B4-BE49-F238E27FC236}">
+                <a16:creationId xmlns:a16="http://schemas.microsoft.com/office/drawing/2014/main" id="{DD0FD9D6-CC53-F423-F94F-A2599195B3C2}"/>
               </a:ext>
             </a:extLst>
           </p:cNvPr>
@@ -11949,8 +12856,8 @@
         </p:nvSpPr>
         <p:spPr>
           <a:xfrm>
-            <a:off x="838200" y="2102277"/>
-            <a:ext cx="10515600" cy="1518000"/>
+            <a:off x="838200" y="3729574"/>
+            <a:ext cx="10515600" cy="2126946"/>
           </a:xfrm>
         </p:spPr>
         <p:txBody>
@@ -11958,165 +12865,70 @@
           <a:lstStyle/>
           <a:p>
             <a:r>
-              <a:rPr lang="de-DE" dirty="0"/>
-              <a:t>Byte Darstellung des Assemblercodes</a:t>
-            </a:r>
-          </a:p>
-          <a:p>
-            <a:r>
-              <a:rPr lang="de-DE" dirty="0"/>
-              <a:t>Kontrollflussgraphen des Assemblercodes (Node == Basic Block) </a:t>
-            </a:r>
-          </a:p>
-          <a:p>
-            <a:r>
-              <a:rPr lang="de-DE" dirty="0"/>
-              <a:t>Darstellung als Reihen von Instruktionen des Assemblercodes</a:t>
-            </a:r>
-          </a:p>
-        </p:txBody>
-      </p:sp>
-      <mc:AlternateContent xmlns:mc="http://schemas.openxmlformats.org/markup-compatibility/2006" xmlns:a14="http://schemas.microsoft.com/office/drawing/2010/main">
-        <mc:Choice Requires="a14">
-          <p:sp>
-            <p:nvSpPr>
-              <p:cNvPr id="8" name="Textfeld 7">
-                <a:extLst>
-                  <a:ext uri="{FF2B5EF4-FFF2-40B4-BE49-F238E27FC236}">
-                    <a16:creationId xmlns:a16="http://schemas.microsoft.com/office/drawing/2014/main" id="{D4EA6077-5FB7-968D-8F52-F97D958A6BBB}"/>
-                  </a:ext>
-                </a:extLst>
-              </p:cNvPr>
-              <p:cNvSpPr txBox="1"/>
-              <p:nvPr/>
-            </p:nvSpPr>
-            <p:spPr>
-              <a:xfrm>
-                <a:off x="985545" y="4215094"/>
-                <a:ext cx="10808521" cy="1107996"/>
-              </a:xfrm>
-              <a:prstGeom prst="rect">
-                <a:avLst/>
-              </a:prstGeom>
-              <a:noFill/>
-            </p:spPr>
-            <p:txBody>
-              <a:bodyPr wrap="square">
-                <a:spAutoFit/>
-              </a:bodyPr>
-              <a:lstStyle/>
-              <a:p>
-                <a14:m>
-                  <m:oMath xmlns:m="http://schemas.openxmlformats.org/officeDocument/2006/math">
-                    <m:r>
-                      <a:rPr lang="de-DE" sz="2400" i="1" smtClean="0">
-                        <a:latin typeface="Cambria Math" panose="02040503050406030204" pitchFamily="18" charset="0"/>
-                        <a:ea typeface="Cambria Math" panose="02040503050406030204" pitchFamily="18" charset="0"/>
-                      </a:rPr>
-                      <m:t>→</m:t>
-                    </m:r>
-                  </m:oMath>
-                </a14:m>
-                <a:r>
-                  <a:rPr lang="de-DE" sz="2400" dirty="0"/>
-                  <a:t> Semantik des Codes nur kaum oder gar nicht in den Trainingsdaten</a:t>
-                </a:r>
-              </a:p>
-              <a:p>
-                <a:pPr>
-                  <a:spcAft>
-                    <a:spcPts val="0"/>
-                  </a:spcAft>
-                </a:pPr>
-                <a14:m>
-                  <m:oMath xmlns:m="http://schemas.openxmlformats.org/officeDocument/2006/math">
-                    <m:r>
-                      <a:rPr lang="de-DE" sz="2400" i="1" smtClean="0">
-                        <a:latin typeface="Cambria Math" panose="02040503050406030204" pitchFamily="18" charset="0"/>
-                        <a:ea typeface="Cambria Math" panose="02040503050406030204" pitchFamily="18" charset="0"/>
-                      </a:rPr>
-                      <m:t>→</m:t>
-                    </m:r>
-                    <m:r>
-                      <a:rPr lang="de-DE" sz="2400" b="0" i="1" smtClean="0">
-                        <a:latin typeface="Cambria Math" panose="02040503050406030204" pitchFamily="18" charset="0"/>
-                        <a:ea typeface="Cambria Math" panose="02040503050406030204" pitchFamily="18" charset="0"/>
-                      </a:rPr>
-                      <m:t> </m:t>
-                    </m:r>
-                  </m:oMath>
-                </a14:m>
-                <a:r>
-                  <a:rPr lang="de-DE" sz="2400" dirty="0"/>
-                  <a:t>Beim </a:t>
-                </a:r>
-                <a:r>
-                  <a:rPr lang="de-DE" sz="2400" dirty="0">
-                    <a:effectLst/>
-                  </a:rPr>
-                  <a:t>kompilieren zum Assemblercode gehen sehr viele Informationen Verloren</a:t>
-                </a:r>
-              </a:p>
-              <a:p>
-                <a:pPr>
-                  <a:spcAft>
-                    <a:spcPts val="0"/>
-                  </a:spcAft>
-                </a:pPr>
-                <a:endParaRPr lang="de-DE" dirty="0"/>
-              </a:p>
-            </p:txBody>
-          </p:sp>
-        </mc:Choice>
-        <mc:Fallback xmlns="">
-          <p:sp>
-            <p:nvSpPr>
-              <p:cNvPr id="8" name="Textfeld 7">
-                <a:extLst>
-                  <a:ext uri="{FF2B5EF4-FFF2-40B4-BE49-F238E27FC236}">
-                    <a16:creationId xmlns:a16="http://schemas.microsoft.com/office/drawing/2014/main" id="{D4EA6077-5FB7-968D-8F52-F97D958A6BBB}"/>
-                  </a:ext>
-                </a:extLst>
-              </p:cNvPr>
-              <p:cNvSpPr txBox="1">
-                <a:spLocks noRot="1" noChangeAspect="1" noMove="1" noResize="1" noEditPoints="1" noAdjustHandles="1" noChangeArrowheads="1" noChangeShapeType="1" noTextEdit="1"/>
-              </p:cNvSpPr>
-              <p:nvPr/>
-            </p:nvSpPr>
-            <p:spPr>
-              <a:xfrm>
-                <a:off x="985545" y="4215094"/>
-                <a:ext cx="10808521" cy="1107996"/>
-              </a:xfrm>
-              <a:prstGeom prst="rect">
-                <a:avLst/>
-              </a:prstGeom>
-              <a:blipFill>
-                <a:blip r:embed="rId2"/>
-                <a:stretch>
-                  <a:fillRect t="-4396" r="-338"/>
-                </a:stretch>
-              </a:blipFill>
-            </p:spPr>
-            <p:txBody>
-              <a:bodyPr/>
-              <a:lstStyle/>
-              <a:p>
-                <a:r>
-                  <a:rPr lang="de-DE">
-                    <a:noFill/>
-                  </a:rPr>
-                  <a:t> </a:t>
-                </a:r>
-              </a:p>
-            </p:txBody>
-          </p:sp>
-        </mc:Fallback>
-      </mc:AlternateContent>
+              <a:rPr lang="en-US" dirty="0"/>
+              <a:t>Sentence Transformer on C Source Code Comments</a:t>
+            </a:r>
+          </a:p>
+          <a:p>
+            <a:r>
+              <a:rPr lang="en-US" dirty="0"/>
+              <a:t>Sentence Transformer on C Source Code Names</a:t>
+            </a:r>
+          </a:p>
+          <a:p>
+            <a:r>
+              <a:rPr lang="en-US" dirty="0"/>
+              <a:t>Sentence Transformer on Llama generated Code Summaries</a:t>
+            </a:r>
+          </a:p>
+          <a:p>
+            <a:r>
+              <a:rPr lang="en-US" dirty="0"/>
+              <a:t>Code2Vec </a:t>
+            </a:r>
+          </a:p>
+          <a:p>
+            <a:endParaRPr lang="en-US" dirty="0"/>
+          </a:p>
+          <a:p>
+            <a:endParaRPr lang="en-US" dirty="0"/>
+          </a:p>
+        </p:txBody>
+      </p:sp>
+      <p:pic>
+        <p:nvPicPr>
+          <p:cNvPr id="10" name="Picture 9" descr="A black background with a black square&#10;&#10;Description automatically generated with medium confidence">
+            <a:extLst>
+              <a:ext uri="{FF2B5EF4-FFF2-40B4-BE49-F238E27FC236}">
+                <a16:creationId xmlns:a16="http://schemas.microsoft.com/office/drawing/2014/main" id="{8D4DEFE6-F178-432B-6392-0A3CB55BF537}"/>
+              </a:ext>
+            </a:extLst>
+          </p:cNvPr>
+          <p:cNvPicPr>
+            <a:picLocks noChangeAspect="1"/>
+          </p:cNvPicPr>
+          <p:nvPr/>
+        </p:nvPicPr>
+        <p:blipFill>
+          <a:blip r:embed="rId2"/>
+          <a:stretch>
+            <a:fillRect/>
+          </a:stretch>
+        </p:blipFill>
+        <p:spPr>
+          <a:xfrm>
+            <a:off x="3478495" y="1438584"/>
+            <a:ext cx="5235009" cy="2126946"/>
+          </a:xfrm>
+          <a:prstGeom prst="rect">
+            <a:avLst/>
+          </a:prstGeom>
+        </p:spPr>
+      </p:pic>
     </p:spTree>
     <p:extLst>
       <p:ext uri="{BB962C8B-B14F-4D97-AF65-F5344CB8AC3E}">
-        <p14:creationId xmlns:p14="http://schemas.microsoft.com/office/powerpoint/2010/main" val="652343218"/>
+        <p14:creationId xmlns:p14="http://schemas.microsoft.com/office/powerpoint/2010/main" val="1088825835"/>
       </p:ext>
     </p:extLst>
   </p:cSld>
@@ -12145,10 +12957,10 @@
       </p:grpSpPr>
       <p:sp>
         <p:nvSpPr>
-          <p:cNvPr id="2" name="Titel 1">
-            <a:extLst>
-              <a:ext uri="{FF2B5EF4-FFF2-40B4-BE49-F238E27FC236}">
-                <a16:creationId xmlns:a16="http://schemas.microsoft.com/office/drawing/2014/main" id="{4E0CE257-127B-9FA3-765A-C5D90A17C486}"/>
+          <p:cNvPr id="2" name="Title 1">
+            <a:extLst>
+              <a:ext uri="{FF2B5EF4-FFF2-40B4-BE49-F238E27FC236}">
+                <a16:creationId xmlns:a16="http://schemas.microsoft.com/office/drawing/2014/main" id="{96DA1EDE-7580-2EAD-78C0-4685D7A129AD}"/>
               </a:ext>
             </a:extLst>
           </p:cNvPr>
@@ -12159,32 +12971,28 @@
             <p:ph type="title"/>
           </p:nvPr>
         </p:nvSpPr>
-        <p:spPr>
-          <a:xfrm>
-            <a:off x="838200" y="365125"/>
-            <a:ext cx="10515600" cy="1325563"/>
-          </a:xfrm>
-        </p:spPr>
-        <p:txBody>
-          <a:bodyPr anchor="ctr">
-            <a:normAutofit/>
-          </a:bodyPr>
+        <p:spPr/>
+        <p:txBody>
+          <a:bodyPr/>
           <a:lstStyle/>
           <a:p>
             <a:r>
-              <a:rPr lang="de-DE"/>
-              <a:t>Trainings Daten mit Source Code Information</a:t>
-            </a:r>
-            <a:endParaRPr lang="de-DE" dirty="0"/>
-          </a:p>
-        </p:txBody>
-      </p:sp>
-      <p:sp>
-        <p:nvSpPr>
-          <p:cNvPr id="3" name="Datumsplatzhalter 2">
-            <a:extLst>
-              <a:ext uri="{FF2B5EF4-FFF2-40B4-BE49-F238E27FC236}">
-                <a16:creationId xmlns:a16="http://schemas.microsoft.com/office/drawing/2014/main" id="{0C599950-CB4E-B832-C0EF-C33D0AECB9F9}"/>
+              <a:rPr lang="en-US" dirty="0"/>
+              <a:t>C Source Code Comments</a:t>
+            </a:r>
+            <a:br>
+              <a:rPr lang="en-US" dirty="0"/>
+            </a:br>
+            <a:endParaRPr lang="en-US" dirty="0"/>
+          </a:p>
+        </p:txBody>
+      </p:sp>
+      <p:sp>
+        <p:nvSpPr>
+          <p:cNvPr id="3" name="Date Placeholder 2">
+            <a:extLst>
+              <a:ext uri="{FF2B5EF4-FFF2-40B4-BE49-F238E27FC236}">
+                <a16:creationId xmlns:a16="http://schemas.microsoft.com/office/drawing/2014/main" id="{DDF9BC24-3B32-B1F6-79E4-E4D1F4C7AABF}"/>
               </a:ext>
             </a:extLst>
           </p:cNvPr>
@@ -12195,23 +13003,12 @@
             <p:ph type="dt" sz="half" idx="10"/>
           </p:nvPr>
         </p:nvSpPr>
-        <p:spPr>
-          <a:xfrm>
-            <a:off x="838200" y="6356350"/>
-            <a:ext cx="2743200" cy="365125"/>
-          </a:xfrm>
-        </p:spPr>
-        <p:txBody>
-          <a:bodyPr anchor="ctr">
-            <a:normAutofit/>
-          </a:bodyPr>
+        <p:spPr/>
+        <p:txBody>
+          <a:bodyPr/>
           <a:lstStyle/>
           <a:p>
-            <a:pPr rtl="0">
-              <a:spcAft>
-                <a:spcPts val="600"/>
-              </a:spcAft>
-            </a:pPr>
+            <a:pPr rtl="0"/>
             <a:r>
               <a:rPr lang="de-DE"/>
               <a:t>20XX</a:t>
@@ -12221,10 +13018,10 @@
       </p:sp>
       <p:sp>
         <p:nvSpPr>
-          <p:cNvPr id="4" name="Fußzeilenplatzhalter 3">
-            <a:extLst>
-              <a:ext uri="{FF2B5EF4-FFF2-40B4-BE49-F238E27FC236}">
-                <a16:creationId xmlns:a16="http://schemas.microsoft.com/office/drawing/2014/main" id="{88E09410-A383-CE2D-739F-52C424469757}"/>
+          <p:cNvPr id="4" name="Footer Placeholder 3">
+            <a:extLst>
+              <a:ext uri="{FF2B5EF4-FFF2-40B4-BE49-F238E27FC236}">
+                <a16:creationId xmlns:a16="http://schemas.microsoft.com/office/drawing/2014/main" id="{82A75E25-1927-C0D0-8986-5100F485FE77}"/>
               </a:ext>
             </a:extLst>
           </p:cNvPr>
@@ -12235,23 +13032,12 @@
             <p:ph type="ftr" sz="quarter" idx="11"/>
           </p:nvPr>
         </p:nvSpPr>
-        <p:spPr>
-          <a:xfrm>
-            <a:off x="4038600" y="6356350"/>
-            <a:ext cx="4114800" cy="365125"/>
-          </a:xfrm>
-        </p:spPr>
-        <p:txBody>
-          <a:bodyPr anchor="ctr">
-            <a:normAutofit/>
-          </a:bodyPr>
+        <p:spPr/>
+        <p:txBody>
+          <a:bodyPr/>
           <a:lstStyle/>
           <a:p>
-            <a:pPr rtl="0">
-              <a:spcAft>
-                <a:spcPts val="600"/>
-              </a:spcAft>
-            </a:pPr>
+            <a:pPr rtl="0"/>
             <a:r>
               <a:rPr lang="de-DE"/>
               <a:t>PRÄSENTATIONSTITEL</a:t>
@@ -12261,10 +13047,10 @@
       </p:sp>
       <p:sp>
         <p:nvSpPr>
-          <p:cNvPr id="5" name="Foliennummernplatzhalter 4">
-            <a:extLst>
-              <a:ext uri="{FF2B5EF4-FFF2-40B4-BE49-F238E27FC236}">
-                <a16:creationId xmlns:a16="http://schemas.microsoft.com/office/drawing/2014/main" id="{FFECCBB5-DDE9-49DA-E556-0828DE931224}"/>
+          <p:cNvPr id="5" name="Slide Number Placeholder 4">
+            <a:extLst>
+              <a:ext uri="{FF2B5EF4-FFF2-40B4-BE49-F238E27FC236}">
+                <a16:creationId xmlns:a16="http://schemas.microsoft.com/office/drawing/2014/main" id="{63CE30E2-C6CE-D4E3-AE97-ABCE15C33DE7}"/>
               </a:ext>
             </a:extLst>
           </p:cNvPr>
@@ -12275,42 +13061,27 @@
             <p:ph type="sldNum" sz="quarter" idx="12"/>
           </p:nvPr>
         </p:nvSpPr>
-        <p:spPr>
-          <a:xfrm>
-            <a:off x="8610600" y="6356350"/>
-            <a:ext cx="2743200" cy="365125"/>
-          </a:xfrm>
-        </p:spPr>
-        <p:txBody>
-          <a:bodyPr anchor="ctr">
-            <a:normAutofit/>
-          </a:bodyPr>
+        <p:spPr/>
+        <p:txBody>
+          <a:bodyPr/>
           <a:lstStyle/>
           <a:p>
-            <a:pPr rtl="0">
-              <a:spcAft>
-                <a:spcPts val="600"/>
-              </a:spcAft>
-            </a:pPr>
+            <a:pPr rtl="0"/>
             <a:fld id="{A49DFD55-3C28-40EF-9E31-A92D2E4017FF}" type="slidenum">
               <a:rPr lang="de-DE" smtClean="0"/>
-              <a:pPr rtl="0">
-                <a:spcAft>
-                  <a:spcPts val="600"/>
-                </a:spcAft>
-              </a:pPr>
+              <a:pPr rtl="0"/>
               <a:t>8</a:t>
             </a:fld>
-            <a:endParaRPr lang="de-DE"/>
-          </a:p>
-        </p:txBody>
-      </p:sp>
-      <p:sp>
-        <p:nvSpPr>
-          <p:cNvPr id="24" name="Chart Placeholder 5">
-            <a:extLst>
-              <a:ext uri="{FF2B5EF4-FFF2-40B4-BE49-F238E27FC236}">
-                <a16:creationId xmlns:a16="http://schemas.microsoft.com/office/drawing/2014/main" id="{53C3A909-782F-4152-578C-CADB2F222376}"/>
+            <a:endParaRPr lang="de-DE" dirty="0"/>
+          </a:p>
+        </p:txBody>
+      </p:sp>
+      <p:sp>
+        <p:nvSpPr>
+          <p:cNvPr id="6" name="Chart Placeholder 5">
+            <a:extLst>
+              <a:ext uri="{FF2B5EF4-FFF2-40B4-BE49-F238E27FC236}">
+                <a16:creationId xmlns:a16="http://schemas.microsoft.com/office/drawing/2014/main" id="{091F9203-5BEA-A90A-04E4-A2E6AA83D19E}"/>
               </a:ext>
             </a:extLst>
           </p:cNvPr>
@@ -12323,22 +13094,203 @@
         </p:nvSpPr>
         <p:spPr>
           <a:xfrm>
-            <a:off x="838200" y="2111608"/>
-            <a:ext cx="10515600" cy="3744912"/>
+            <a:off x="838200" y="4096986"/>
+            <a:ext cx="10515600" cy="1759533"/>
           </a:xfrm>
         </p:spPr>
         <p:txBody>
           <a:bodyPr/>
           <a:lstStyle/>
           <a:p>
-            <a:endParaRPr lang="de-DE"/>
+            <a:endParaRPr lang="en-US" dirty="0"/>
           </a:p>
         </p:txBody>
       </p:sp>
     </p:spTree>
     <p:extLst>
       <p:ext uri="{BB962C8B-B14F-4D97-AF65-F5344CB8AC3E}">
-        <p14:creationId xmlns:p14="http://schemas.microsoft.com/office/powerpoint/2010/main" val="1136190312"/>
+        <p14:creationId xmlns:p14="http://schemas.microsoft.com/office/powerpoint/2010/main" val="1146340923"/>
+      </p:ext>
+    </p:extLst>
+  </p:cSld>
+  <p:clrMapOvr>
+    <a:masterClrMapping/>
+  </p:clrMapOvr>
+</p:sld>
+</file>
+
+<file path=ppt/slides/slide9.xml><?xml version="1.0" encoding="utf-8"?>
+<p:sld xmlns:a="http://schemas.openxmlformats.org/drawingml/2006/main" xmlns:r="http://schemas.openxmlformats.org/officeDocument/2006/relationships" xmlns:p="http://schemas.openxmlformats.org/presentationml/2006/main">
+  <p:cSld>
+    <p:spTree>
+      <p:nvGrpSpPr>
+        <p:cNvPr id="1" name=""/>
+        <p:cNvGrpSpPr/>
+        <p:nvPr/>
+      </p:nvGrpSpPr>
+      <p:grpSpPr>
+        <a:xfrm>
+          <a:off x="0" y="0"/>
+          <a:ext cx="0" cy="0"/>
+          <a:chOff x="0" y="0"/>
+          <a:chExt cx="0" cy="0"/>
+        </a:xfrm>
+      </p:grpSpPr>
+      <p:sp>
+        <p:nvSpPr>
+          <p:cNvPr id="2" name="Title 1">
+            <a:extLst>
+              <a:ext uri="{FF2B5EF4-FFF2-40B4-BE49-F238E27FC236}">
+                <a16:creationId xmlns:a16="http://schemas.microsoft.com/office/drawing/2014/main" id="{23581B9A-E893-CBCB-10D8-758158B28529}"/>
+              </a:ext>
+            </a:extLst>
+          </p:cNvPr>
+          <p:cNvSpPr>
+            <a:spLocks noGrp="1"/>
+          </p:cNvSpPr>
+          <p:nvPr>
+            <p:ph type="title"/>
+          </p:nvPr>
+        </p:nvSpPr>
+        <p:spPr/>
+        <p:txBody>
+          <a:bodyPr/>
+          <a:lstStyle/>
+          <a:p>
+            <a:r>
+              <a:rPr lang="en-US" dirty="0"/>
+              <a:t>C Source Code Names</a:t>
+            </a:r>
+            <a:br>
+              <a:rPr lang="en-US" dirty="0"/>
+            </a:br>
+            <a:endParaRPr lang="en-US" dirty="0"/>
+          </a:p>
+        </p:txBody>
+      </p:sp>
+      <p:sp>
+        <p:nvSpPr>
+          <p:cNvPr id="3" name="Date Placeholder 2">
+            <a:extLst>
+              <a:ext uri="{FF2B5EF4-FFF2-40B4-BE49-F238E27FC236}">
+                <a16:creationId xmlns:a16="http://schemas.microsoft.com/office/drawing/2014/main" id="{52E27AF6-7ACC-CED6-4F1E-55BFB40BB8AD}"/>
+              </a:ext>
+            </a:extLst>
+          </p:cNvPr>
+          <p:cNvSpPr>
+            <a:spLocks noGrp="1"/>
+          </p:cNvSpPr>
+          <p:nvPr>
+            <p:ph type="dt" sz="half" idx="10"/>
+          </p:nvPr>
+        </p:nvSpPr>
+        <p:spPr/>
+        <p:txBody>
+          <a:bodyPr/>
+          <a:lstStyle/>
+          <a:p>
+            <a:pPr rtl="0"/>
+            <a:r>
+              <a:rPr lang="de-DE"/>
+              <a:t>20XX</a:t>
+            </a:r>
+          </a:p>
+        </p:txBody>
+      </p:sp>
+      <p:sp>
+        <p:nvSpPr>
+          <p:cNvPr id="4" name="Footer Placeholder 3">
+            <a:extLst>
+              <a:ext uri="{FF2B5EF4-FFF2-40B4-BE49-F238E27FC236}">
+                <a16:creationId xmlns:a16="http://schemas.microsoft.com/office/drawing/2014/main" id="{931D3360-DC4E-3BF9-A90E-0C00781112AD}"/>
+              </a:ext>
+            </a:extLst>
+          </p:cNvPr>
+          <p:cNvSpPr>
+            <a:spLocks noGrp="1"/>
+          </p:cNvSpPr>
+          <p:nvPr>
+            <p:ph type="ftr" sz="quarter" idx="11"/>
+          </p:nvPr>
+        </p:nvSpPr>
+        <p:spPr/>
+        <p:txBody>
+          <a:bodyPr/>
+          <a:lstStyle/>
+          <a:p>
+            <a:pPr rtl="0"/>
+            <a:r>
+              <a:rPr lang="de-DE"/>
+              <a:t>PRÄSENTATIONSTITEL</a:t>
+            </a:r>
+          </a:p>
+        </p:txBody>
+      </p:sp>
+      <p:sp>
+        <p:nvSpPr>
+          <p:cNvPr id="5" name="Slide Number Placeholder 4">
+            <a:extLst>
+              <a:ext uri="{FF2B5EF4-FFF2-40B4-BE49-F238E27FC236}">
+                <a16:creationId xmlns:a16="http://schemas.microsoft.com/office/drawing/2014/main" id="{4910D150-2BDF-1659-2BFF-30CFD4096D5D}"/>
+              </a:ext>
+            </a:extLst>
+          </p:cNvPr>
+          <p:cNvSpPr>
+            <a:spLocks noGrp="1"/>
+          </p:cNvSpPr>
+          <p:nvPr>
+            <p:ph type="sldNum" sz="quarter" idx="12"/>
+          </p:nvPr>
+        </p:nvSpPr>
+        <p:spPr/>
+        <p:txBody>
+          <a:bodyPr/>
+          <a:lstStyle/>
+          <a:p>
+            <a:pPr rtl="0"/>
+            <a:fld id="{A49DFD55-3C28-40EF-9E31-A92D2E4017FF}" type="slidenum">
+              <a:rPr lang="de-DE" smtClean="0"/>
+              <a:pPr rtl="0"/>
+              <a:t>9</a:t>
+            </a:fld>
+            <a:endParaRPr lang="de-DE" dirty="0"/>
+          </a:p>
+        </p:txBody>
+      </p:sp>
+      <p:sp>
+        <p:nvSpPr>
+          <p:cNvPr id="6" name="Chart Placeholder 5">
+            <a:extLst>
+              <a:ext uri="{FF2B5EF4-FFF2-40B4-BE49-F238E27FC236}">
+                <a16:creationId xmlns:a16="http://schemas.microsoft.com/office/drawing/2014/main" id="{3AFD5A68-BA8B-384B-BB06-CCC2B033CAE7}"/>
+              </a:ext>
+            </a:extLst>
+          </p:cNvPr>
+          <p:cNvSpPr>
+            <a:spLocks noGrp="1"/>
+          </p:cNvSpPr>
+          <p:nvPr>
+            <p:ph type="chart" sz="quarter" idx="13"/>
+          </p:nvPr>
+        </p:nvSpPr>
+        <p:spPr>
+          <a:xfrm>
+            <a:off x="838200" y="3883230"/>
+            <a:ext cx="10515600" cy="1973289"/>
+          </a:xfrm>
+        </p:spPr>
+        <p:txBody>
+          <a:bodyPr/>
+          <a:lstStyle/>
+          <a:p>
+            <a:endParaRPr lang="en-US"/>
+          </a:p>
+        </p:txBody>
+      </p:sp>
+    </p:spTree>
+    <p:extLst>
+      <p:ext uri="{BB962C8B-B14F-4D97-AF65-F5344CB8AC3E}">
+        <p14:creationId xmlns:p14="http://schemas.microsoft.com/office/powerpoint/2010/main" val="3566871610"/>
       </p:ext>
     </p:extLst>
   </p:cSld>
@@ -13140,25 +14092,6 @@
 </file>
 
 <file path=customXml/item1.xml><?xml version="1.0" encoding="utf-8"?>
-<p:properties xmlns:p="http://schemas.microsoft.com/office/2006/metadata/properties" xmlns:xsi="http://www.w3.org/2001/XMLSchema-instance" xmlns:pc="http://schemas.microsoft.com/office/infopath/2007/PartnerControls">
-  <documentManagement>
-    <_ip_UnifiedCompliancePolicyUIAction xmlns="http://schemas.microsoft.com/sharepoint/v3" xsi:nil="true"/>
-    <Image xmlns="71af3243-3dd4-4a8d-8c0d-dd76da1f02a5">
-      <Url xsi:nil="true"/>
-      <Description xsi:nil="true"/>
-    </Image>
-    <Status xmlns="71af3243-3dd4-4a8d-8c0d-dd76da1f02a5">Not started</Status>
-    <_ip_UnifiedCompliancePolicyProperties xmlns="http://schemas.microsoft.com/sharepoint/v3" xsi:nil="true"/>
-    <ImageTagsTaxHTField xmlns="71af3243-3dd4-4a8d-8c0d-dd76da1f02a5">
-      <Terms xmlns="http://schemas.microsoft.com/office/infopath/2007/PartnerControls"/>
-    </ImageTagsTaxHTField>
-    <TaxCatchAll xmlns="230e9df3-be65-4c73-a93b-d1236ebd677e"/>
-    <MediaServiceKeyPoints xmlns="71af3243-3dd4-4a8d-8c0d-dd76da1f02a5" xsi:nil="true"/>
-  </documentManagement>
-</p:properties>
-</file>
-
-<file path=customXml/item2.xml><?xml version="1.0" encoding="utf-8"?>
 <ct:contentTypeSchema xmlns:ct="http://schemas.microsoft.com/office/2006/metadata/contentType" xmlns:ma="http://schemas.microsoft.com/office/2006/metadata/properties/metaAttributes" ct:_="" ma:_="" ma:contentTypeName="Document" ma:contentTypeID="0x01010079F111ED35F8CC479449609E8A0923A6" ma:contentTypeVersion="20" ma:contentTypeDescription="Create a new document." ma:contentTypeScope="" ma:versionID="1267097ee5f5874adfcc408041ae252e">
   <xsd:schema xmlns:xsd="http://www.w3.org/2001/XMLSchema" xmlns:xs="http://www.w3.org/2001/XMLSchema" xmlns:p="http://schemas.microsoft.com/office/2006/metadata/properties" xmlns:ns1="http://schemas.microsoft.com/sharepoint/v3" xmlns:ns2="71af3243-3dd4-4a8d-8c0d-dd76da1f02a5" xmlns:ns3="16c05727-aa75-4e4a-9b5f-8a80a1165891" xmlns:ns4="230e9df3-be65-4c73-a93b-d1236ebd677e" targetNamespace="http://schemas.microsoft.com/office/2006/metadata/properties" ma:root="true" ma:fieldsID="395891a93df65b14727750f2c06c306c" ns1:_="" ns2:_="" ns3:_="" ns4:_="">
     <xsd:import namespace="http://schemas.microsoft.com/sharepoint/v3"/>
@@ -13434,6 +14367,25 @@
 </ct:contentTypeSchema>
 </file>
 
+<file path=customXml/item2.xml><?xml version="1.0" encoding="utf-8"?>
+<p:properties xmlns:p="http://schemas.microsoft.com/office/2006/metadata/properties" xmlns:xsi="http://www.w3.org/2001/XMLSchema-instance" xmlns:pc="http://schemas.microsoft.com/office/infopath/2007/PartnerControls">
+  <documentManagement>
+    <_ip_UnifiedCompliancePolicyUIAction xmlns="http://schemas.microsoft.com/sharepoint/v3" xsi:nil="true"/>
+    <Image xmlns="71af3243-3dd4-4a8d-8c0d-dd76da1f02a5">
+      <Url xsi:nil="true"/>
+      <Description xsi:nil="true"/>
+    </Image>
+    <Status xmlns="71af3243-3dd4-4a8d-8c0d-dd76da1f02a5">Not started</Status>
+    <_ip_UnifiedCompliancePolicyProperties xmlns="http://schemas.microsoft.com/sharepoint/v3" xsi:nil="true"/>
+    <ImageTagsTaxHTField xmlns="71af3243-3dd4-4a8d-8c0d-dd76da1f02a5">
+      <Terms xmlns="http://schemas.microsoft.com/office/infopath/2007/PartnerControls"/>
+    </ImageTagsTaxHTField>
+    <TaxCatchAll xmlns="230e9df3-be65-4c73-a93b-d1236ebd677e"/>
+    <MediaServiceKeyPoints xmlns="71af3243-3dd4-4a8d-8c0d-dd76da1f02a5" xsi:nil="true"/>
+  </documentManagement>
+</p:properties>
+</file>
+
 <file path=customXml/item3.xml><?xml version="1.0" encoding="utf-8"?>
 <?mso-contentType ?>
 <FormTemplates xmlns="http://schemas.microsoft.com/sharepoint/v3/contenttype/forms">
@@ -13444,25 +14396,6 @@
 </file>
 
 <file path=customXml/itemProps1.xml><?xml version="1.0" encoding="utf-8"?>
-<ds:datastoreItem xmlns:ds="http://schemas.openxmlformats.org/officeDocument/2006/customXml" ds:itemID="{29C43685-694E-4579-B109-3C418D49DA65}">
-  <ds:schemaRefs>
-    <ds:schemaRef ds:uri="16c05727-aa75-4e4a-9b5f-8a80a1165891"/>
-    <ds:schemaRef ds:uri="http://purl.org/dc/terms/"/>
-    <ds:schemaRef ds:uri="http://purl.org/dc/elements/1.1/"/>
-    <ds:schemaRef ds:uri="http://purl.org/dc/dcmitype/"/>
-    <ds:schemaRef ds:uri="http://schemas.microsoft.com/office/2006/documentManagement/types"/>
-    <ds:schemaRef ds:uri="http://schemas.openxmlformats.org/package/2006/metadata/core-properties"/>
-    <ds:schemaRef ds:uri="http://schemas.microsoft.com/office/infopath/2007/PartnerControls"/>
-    <ds:schemaRef ds:uri="http://www.w3.org/XML/1998/namespace"/>
-    <ds:schemaRef ds:uri="230e9df3-be65-4c73-a93b-d1236ebd677e"/>
-    <ds:schemaRef ds:uri="71af3243-3dd4-4a8d-8c0d-dd76da1f02a5"/>
-    <ds:schemaRef ds:uri="http://schemas.microsoft.com/sharepoint/v3"/>
-    <ds:schemaRef ds:uri="http://schemas.microsoft.com/office/2006/metadata/properties"/>
-  </ds:schemaRefs>
-</ds:datastoreItem>
-</file>
-
-<file path=customXml/itemProps2.xml><?xml version="1.0" encoding="utf-8"?>
 <ds:datastoreItem xmlns:ds="http://schemas.openxmlformats.org/officeDocument/2006/customXml" ds:itemID="{CC96B61E-1B64-430F-934F-7D1B90028029}">
   <ds:schemaRefs>
     <ds:schemaRef ds:uri="http://schemas.microsoft.com/office/2006/metadata/contentType"/>
@@ -13483,6 +14416,25 @@
 </ds:datastoreItem>
 </file>
 
+<file path=customXml/itemProps2.xml><?xml version="1.0" encoding="utf-8"?>
+<ds:datastoreItem xmlns:ds="http://schemas.openxmlformats.org/officeDocument/2006/customXml" ds:itemID="{29C43685-694E-4579-B109-3C418D49DA65}">
+  <ds:schemaRefs>
+    <ds:schemaRef ds:uri="16c05727-aa75-4e4a-9b5f-8a80a1165891"/>
+    <ds:schemaRef ds:uri="http://purl.org/dc/terms/"/>
+    <ds:schemaRef ds:uri="http://purl.org/dc/elements/1.1/"/>
+    <ds:schemaRef ds:uri="http://purl.org/dc/dcmitype/"/>
+    <ds:schemaRef ds:uri="http://schemas.microsoft.com/office/2006/documentManagement/types"/>
+    <ds:schemaRef ds:uri="http://schemas.openxmlformats.org/package/2006/metadata/core-properties"/>
+    <ds:schemaRef ds:uri="http://schemas.microsoft.com/office/infopath/2007/PartnerControls"/>
+    <ds:schemaRef ds:uri="http://www.w3.org/XML/1998/namespace"/>
+    <ds:schemaRef ds:uri="230e9df3-be65-4c73-a93b-d1236ebd677e"/>
+    <ds:schemaRef ds:uri="71af3243-3dd4-4a8d-8c0d-dd76da1f02a5"/>
+    <ds:schemaRef ds:uri="http://schemas.microsoft.com/sharepoint/v3"/>
+    <ds:schemaRef ds:uri="http://schemas.microsoft.com/office/2006/metadata/properties"/>
+  </ds:schemaRefs>
+</ds:datastoreItem>
+</file>
+
 <file path=customXml/itemProps3.xml><?xml version="1.0" encoding="utf-8"?>
 <ds:datastoreItem xmlns:ds="http://schemas.openxmlformats.org/officeDocument/2006/customXml" ds:itemID="{0FD6FE22-81A0-4500-AFD0-342D21BB9A2C}">
   <ds:schemaRefs>

</xml_diff>